<commit_message>
Update and Add ppts
</commit_message>
<xml_diff>
--- a/一切歌頌讚美(崇拜版).pptx
+++ b/一切歌頌讚美(崇拜版).pptx
@@ -7,6 +7,7 @@
   <p:sldIdLst>
     <p:sldId id="256" r:id="rId2"/>
     <p:sldId id="257" r:id="rId3"/>
+    <p:sldId id="258" r:id="rId4"/>
   </p:sldIdLst>
   <p:sldSz cx="9144000" cy="5143500" type="screen16x9"/>
   <p:notesSz cx="6858000" cy="9144000"/>
@@ -305,7 +306,7 @@
           <a:p>
             <a:fld id="{BFEB1A99-8C3F-4D98-8584-B5DB38B1A655}" type="datetimeFigureOut">
               <a:rPr lang="zh-TW" altLang="en-US" smtClean="0"/>
-              <a:t>2020/5/16</a:t>
+              <a:t>2020/7/25</a:t>
             </a:fld>
             <a:endParaRPr lang="zh-TW" altLang="en-US"/>
           </a:p>
@@ -470,7 +471,7 @@
           <a:p>
             <a:fld id="{BFEB1A99-8C3F-4D98-8584-B5DB38B1A655}" type="datetimeFigureOut">
               <a:rPr lang="zh-TW" altLang="en-US" smtClean="0"/>
-              <a:t>2020/5/16</a:t>
+              <a:t>2020/7/25</a:t>
             </a:fld>
             <a:endParaRPr lang="zh-TW" altLang="en-US"/>
           </a:p>
@@ -645,7 +646,7 @@
           <a:p>
             <a:fld id="{BFEB1A99-8C3F-4D98-8584-B5DB38B1A655}" type="datetimeFigureOut">
               <a:rPr lang="zh-TW" altLang="en-US" smtClean="0"/>
-              <a:t>2020/5/16</a:t>
+              <a:t>2020/7/25</a:t>
             </a:fld>
             <a:endParaRPr lang="zh-TW" altLang="en-US"/>
           </a:p>
@@ -810,7 +811,7 @@
           <a:p>
             <a:fld id="{BFEB1A99-8C3F-4D98-8584-B5DB38B1A655}" type="datetimeFigureOut">
               <a:rPr lang="zh-TW" altLang="en-US" smtClean="0"/>
-              <a:t>2020/5/16</a:t>
+              <a:t>2020/7/25</a:t>
             </a:fld>
             <a:endParaRPr lang="zh-TW" altLang="en-US"/>
           </a:p>
@@ -1051,7 +1052,7 @@
           <a:p>
             <a:fld id="{BFEB1A99-8C3F-4D98-8584-B5DB38B1A655}" type="datetimeFigureOut">
               <a:rPr lang="zh-TW" altLang="en-US" smtClean="0"/>
-              <a:t>2020/5/16</a:t>
+              <a:t>2020/7/25</a:t>
             </a:fld>
             <a:endParaRPr lang="zh-TW" altLang="en-US"/>
           </a:p>
@@ -1334,7 +1335,7 @@
           <a:p>
             <a:fld id="{BFEB1A99-8C3F-4D98-8584-B5DB38B1A655}" type="datetimeFigureOut">
               <a:rPr lang="zh-TW" altLang="en-US" smtClean="0"/>
-              <a:t>2020/5/16</a:t>
+              <a:t>2020/7/25</a:t>
             </a:fld>
             <a:endParaRPr lang="zh-TW" altLang="en-US"/>
           </a:p>
@@ -1751,7 +1752,7 @@
           <a:p>
             <a:fld id="{BFEB1A99-8C3F-4D98-8584-B5DB38B1A655}" type="datetimeFigureOut">
               <a:rPr lang="zh-TW" altLang="en-US" smtClean="0"/>
-              <a:t>2020/5/16</a:t>
+              <a:t>2020/7/25</a:t>
             </a:fld>
             <a:endParaRPr lang="zh-TW" altLang="en-US"/>
           </a:p>
@@ -1864,7 +1865,7 @@
           <a:p>
             <a:fld id="{BFEB1A99-8C3F-4D98-8584-B5DB38B1A655}" type="datetimeFigureOut">
               <a:rPr lang="zh-TW" altLang="en-US" smtClean="0"/>
-              <a:t>2020/5/16</a:t>
+              <a:t>2020/7/25</a:t>
             </a:fld>
             <a:endParaRPr lang="zh-TW" altLang="en-US"/>
           </a:p>
@@ -1954,7 +1955,7 @@
           <a:p>
             <a:fld id="{BFEB1A99-8C3F-4D98-8584-B5DB38B1A655}" type="datetimeFigureOut">
               <a:rPr lang="zh-TW" altLang="en-US" smtClean="0"/>
-              <a:t>2020/5/16</a:t>
+              <a:t>2020/7/25</a:t>
             </a:fld>
             <a:endParaRPr lang="zh-TW" altLang="en-US"/>
           </a:p>
@@ -2226,7 +2227,7 @@
           <a:p>
             <a:fld id="{BFEB1A99-8C3F-4D98-8584-B5DB38B1A655}" type="datetimeFigureOut">
               <a:rPr lang="zh-TW" altLang="en-US" smtClean="0"/>
-              <a:t>2020/5/16</a:t>
+              <a:t>2020/7/25</a:t>
             </a:fld>
             <a:endParaRPr lang="zh-TW" altLang="en-US"/>
           </a:p>
@@ -2478,7 +2479,7 @@
           <a:p>
             <a:fld id="{BFEB1A99-8C3F-4D98-8584-B5DB38B1A655}" type="datetimeFigureOut">
               <a:rPr lang="zh-TW" altLang="en-US" smtClean="0"/>
-              <a:t>2020/5/16</a:t>
+              <a:t>2020/7/25</a:t>
             </a:fld>
             <a:endParaRPr lang="zh-TW" altLang="en-US"/>
           </a:p>
@@ -2691,7 +2692,7 @@
           <a:p>
             <a:fld id="{BFEB1A99-8C3F-4D98-8584-B5DB38B1A655}" type="datetimeFigureOut">
               <a:rPr lang="zh-TW" altLang="en-US" smtClean="0"/>
-              <a:t>2020/5/16</a:t>
+              <a:t>2020/7/25</a:t>
             </a:fld>
             <a:endParaRPr lang="zh-TW" altLang="en-US"/>
           </a:p>
@@ -3563,7 +3564,213 @@
                 <a:latin typeface="微軟正黑體" pitchFamily="34" charset="-120"/>
                 <a:ea typeface="微軟正黑體" pitchFamily="34" charset="-120"/>
               </a:rPr>
-              <a:t>亞  哦</a:t>
+              <a:t>亞  哈</a:t>
+            </a:r>
+            <a:r>
+              <a:rPr lang="zh-TW" altLang="en-US" sz="4800" b="1" dirty="0">
+                <a:solidFill>
+                  <a:srgbClr val="000066"/>
+                </a:solidFill>
+                <a:latin typeface="微軟正黑體" pitchFamily="34" charset="-120"/>
+                <a:ea typeface="微軟正黑體" pitchFamily="34" charset="-120"/>
+              </a:rPr>
+              <a:t>利路</a:t>
+            </a:r>
+            <a:r>
+              <a:rPr lang="zh-TW" altLang="en-US" sz="4800" b="1">
+                <a:solidFill>
+                  <a:srgbClr val="000066"/>
+                </a:solidFill>
+                <a:latin typeface="微軟正黑體" pitchFamily="34" charset="-120"/>
+                <a:ea typeface="微軟正黑體" pitchFamily="34" charset="-120"/>
+              </a:rPr>
+              <a:t>亞 </a:t>
+            </a:r>
+            <a:endParaRPr lang="en-US" altLang="zh-TW" sz="4800" b="1" dirty="0" smtClean="0">
+              <a:solidFill>
+                <a:srgbClr val="000066"/>
+              </a:solidFill>
+              <a:latin typeface="微軟正黑體" pitchFamily="34" charset="-120"/>
+              <a:ea typeface="微軟正黑體" pitchFamily="34" charset="-120"/>
+            </a:endParaRPr>
+          </a:p>
+        </p:txBody>
+      </p:sp>
+    </p:spTree>
+  </p:cSld>
+  <p:clrMapOvr>
+    <a:masterClrMapping/>
+  </p:clrMapOvr>
+</p:sld>
+</file>
+
+<file path=ppt/slides/slide3.xml><?xml version="1.0" encoding="utf-8"?>
+<p:sld xmlns:a="http://schemas.openxmlformats.org/drawingml/2006/main" xmlns:r="http://schemas.openxmlformats.org/officeDocument/2006/relationships" xmlns:p="http://schemas.openxmlformats.org/presentationml/2006/main">
+  <p:cSld>
+    <p:spTree>
+      <p:nvGrpSpPr>
+        <p:cNvPr id="1" name=""/>
+        <p:cNvGrpSpPr/>
+        <p:nvPr/>
+      </p:nvGrpSpPr>
+      <p:grpSpPr>
+        <a:xfrm>
+          <a:off x="0" y="0"/>
+          <a:ext cx="0" cy="0"/>
+          <a:chOff x="0" y="0"/>
+          <a:chExt cx="0" cy="0"/>
+        </a:xfrm>
+      </p:grpSpPr>
+      <p:sp>
+        <p:nvSpPr>
+          <p:cNvPr id="4" name="標題 3"/>
+          <p:cNvSpPr>
+            <a:spLocks noGrp="1"/>
+          </p:cNvSpPr>
+          <p:nvPr>
+            <p:ph type="title"/>
+          </p:nvPr>
+        </p:nvSpPr>
+        <p:spPr/>
+        <p:txBody>
+          <a:bodyPr>
+            <a:normAutofit/>
+          </a:bodyPr>
+          <a:lstStyle/>
+          <a:p>
+            <a:r>
+              <a:rPr lang="zh-TW" altLang="en-US" sz="4000" b="1" dirty="0" smtClean="0">
+                <a:solidFill>
+                  <a:srgbClr val="000066"/>
+                </a:solidFill>
+                <a:latin typeface="微軟正黑體" pitchFamily="34" charset="-120"/>
+                <a:ea typeface="微軟正黑體" pitchFamily="34" charset="-120"/>
+              </a:rPr>
+              <a:t>一切歌頌讚美</a:t>
+            </a:r>
+            <a:endParaRPr lang="zh-TW" altLang="en-US" sz="4000" b="1" dirty="0">
+              <a:solidFill>
+                <a:srgbClr val="000066"/>
+              </a:solidFill>
+              <a:latin typeface="微軟正黑體" pitchFamily="34" charset="-120"/>
+              <a:ea typeface="微軟正黑體" pitchFamily="34" charset="-120"/>
+            </a:endParaRPr>
+          </a:p>
+        </p:txBody>
+      </p:sp>
+      <p:sp>
+        <p:nvSpPr>
+          <p:cNvPr id="5" name="內容版面配置區 4"/>
+          <p:cNvSpPr>
+            <a:spLocks noGrp="1"/>
+          </p:cNvSpPr>
+          <p:nvPr>
+            <p:ph idx="1"/>
+          </p:nvPr>
+        </p:nvSpPr>
+        <p:spPr/>
+        <p:txBody>
+          <a:bodyPr>
+            <a:noAutofit/>
+          </a:bodyPr>
+          <a:lstStyle/>
+          <a:p>
+            <a:pPr algn="ctr">
+              <a:buNone/>
+            </a:pPr>
+            <a:r>
+              <a:rPr lang="zh-TW" altLang="en-US" sz="4800" b="1" dirty="0" smtClean="0">
+                <a:solidFill>
+                  <a:srgbClr val="000066"/>
+                </a:solidFill>
+                <a:latin typeface="微軟正黑體" pitchFamily="34" charset="-120"/>
+                <a:ea typeface="微軟正黑體" pitchFamily="34" charset="-120"/>
+              </a:rPr>
+              <a:t>讚</a:t>
+            </a:r>
+            <a:r>
+              <a:rPr lang="zh-TW" altLang="en-US" sz="4800" b="1" dirty="0">
+                <a:solidFill>
+                  <a:srgbClr val="000066"/>
+                </a:solidFill>
+                <a:latin typeface="微軟正黑體" pitchFamily="34" charset="-120"/>
+                <a:ea typeface="微軟正黑體" pitchFamily="34" charset="-120"/>
+              </a:rPr>
+              <a:t>美主  哈利路亞</a:t>
+            </a:r>
+            <a:endParaRPr lang="en-US" altLang="zh-TW" sz="4800" b="1" dirty="0">
+              <a:solidFill>
+                <a:srgbClr val="000066"/>
+              </a:solidFill>
+              <a:latin typeface="微軟正黑體" pitchFamily="34" charset="-120"/>
+              <a:ea typeface="微軟正黑體" pitchFamily="34" charset="-120"/>
+            </a:endParaRPr>
+          </a:p>
+          <a:p>
+            <a:pPr algn="ctr">
+              <a:buNone/>
+            </a:pPr>
+            <a:r>
+              <a:rPr lang="zh-TW" altLang="en-US" sz="4800" b="1" dirty="0">
+                <a:solidFill>
+                  <a:srgbClr val="000066"/>
+                </a:solidFill>
+                <a:latin typeface="微軟正黑體" pitchFamily="34" charset="-120"/>
+                <a:ea typeface="微軟正黑體" pitchFamily="34" charset="-120"/>
+              </a:rPr>
+              <a:t>哦  讚美主  哈利路</a:t>
+            </a:r>
+            <a:r>
+              <a:rPr lang="zh-TW" altLang="en-US" sz="4800" b="1" dirty="0" smtClean="0">
+                <a:solidFill>
+                  <a:srgbClr val="000066"/>
+                </a:solidFill>
+                <a:latin typeface="微軟正黑體" pitchFamily="34" charset="-120"/>
+                <a:ea typeface="微軟正黑體" pitchFamily="34" charset="-120"/>
+              </a:rPr>
+              <a:t>亞</a:t>
+            </a:r>
+            <a:endParaRPr lang="en-US" altLang="zh-TW" sz="4800" b="1" dirty="0" smtClean="0">
+              <a:solidFill>
+                <a:srgbClr val="000066"/>
+              </a:solidFill>
+              <a:latin typeface="微軟正黑體" pitchFamily="34" charset="-120"/>
+              <a:ea typeface="微軟正黑體" pitchFamily="34" charset="-120"/>
+            </a:endParaRPr>
+          </a:p>
+          <a:p>
+            <a:pPr algn="ctr">
+              <a:buNone/>
+            </a:pPr>
+            <a:r>
+              <a:rPr lang="zh-TW" altLang="en-US" sz="4800" b="1" dirty="0" smtClean="0">
+                <a:solidFill>
+                  <a:srgbClr val="000066"/>
+                </a:solidFill>
+                <a:latin typeface="微軟正黑體" pitchFamily="34" charset="-120"/>
+                <a:ea typeface="微軟正黑體" pitchFamily="34" charset="-120"/>
+              </a:rPr>
+              <a:t>哈</a:t>
+            </a:r>
+            <a:r>
+              <a:rPr lang="zh-TW" altLang="en-US" sz="4800" b="1" dirty="0">
+                <a:solidFill>
+                  <a:srgbClr val="000066"/>
+                </a:solidFill>
+                <a:latin typeface="微軟正黑體" pitchFamily="34" charset="-120"/>
+                <a:ea typeface="微軟正黑體" pitchFamily="34" charset="-120"/>
+              </a:rPr>
+              <a:t>利</a:t>
+            </a:r>
+            <a:r>
+              <a:rPr lang="zh-TW" altLang="en-US" sz="4800" b="1" dirty="0" smtClean="0">
+                <a:solidFill>
+                  <a:srgbClr val="000066"/>
+                </a:solidFill>
+                <a:latin typeface="微軟正黑體" pitchFamily="34" charset="-120"/>
+                <a:ea typeface="微軟正黑體" pitchFamily="34" charset="-120"/>
+              </a:rPr>
+              <a:t>路亞</a:t>
             </a:r>
             <a:endParaRPr lang="zh-TW" altLang="en-US" sz="4800" b="1" dirty="0">
               <a:solidFill>
@@ -3573,9 +3780,26 @@
               <a:ea typeface="微軟正黑體" pitchFamily="34" charset="-120"/>
             </a:endParaRPr>
           </a:p>
+          <a:p>
+            <a:pPr algn="ctr">
+              <a:buNone/>
+            </a:pPr>
+            <a:endParaRPr lang="zh-TW" altLang="en-US" sz="4800" b="1" dirty="0">
+              <a:solidFill>
+                <a:srgbClr val="000066"/>
+              </a:solidFill>
+              <a:latin typeface="微軟正黑體" pitchFamily="34" charset="-120"/>
+              <a:ea typeface="微軟正黑體" pitchFamily="34" charset="-120"/>
+            </a:endParaRPr>
+          </a:p>
         </p:txBody>
       </p:sp>
     </p:spTree>
+    <p:extLst>
+      <p:ext uri="{BB962C8B-B14F-4D97-AF65-F5344CB8AC3E}">
+        <p14:creationId xmlns:p14="http://schemas.microsoft.com/office/powerpoint/2010/main" val="3087116617"/>
+      </p:ext>
+    </p:extLst>
   </p:cSld>
   <p:clrMapOvr>
     <a:masterClrMapping/>

</xml_diff>

<commit_message>
Update ppts & Add new ppt.
</commit_message>
<xml_diff>
--- a/一切歌頌讚美(崇拜版).pptx
+++ b/一切歌頌讚美(崇拜版).pptx
@@ -309,7 +309,7 @@
           <a:p>
             <a:fld id="{BFEB1A99-8C3F-4D98-8584-B5DB38B1A655}" type="datetimeFigureOut">
               <a:rPr lang="zh-TW" altLang="en-US" smtClean="0"/>
-              <a:t>2022/1/7</a:t>
+              <a:t>2022/5/21</a:t>
             </a:fld>
             <a:endParaRPr lang="zh-TW" altLang="en-US"/>
           </a:p>
@@ -474,7 +474,7 @@
           <a:p>
             <a:fld id="{BFEB1A99-8C3F-4D98-8584-B5DB38B1A655}" type="datetimeFigureOut">
               <a:rPr lang="zh-TW" altLang="en-US" smtClean="0"/>
-              <a:t>2022/1/7</a:t>
+              <a:t>2022/5/21</a:t>
             </a:fld>
             <a:endParaRPr lang="zh-TW" altLang="en-US"/>
           </a:p>
@@ -649,7 +649,7 @@
           <a:p>
             <a:fld id="{BFEB1A99-8C3F-4D98-8584-B5DB38B1A655}" type="datetimeFigureOut">
               <a:rPr lang="zh-TW" altLang="en-US" smtClean="0"/>
-              <a:t>2022/1/7</a:t>
+              <a:t>2022/5/21</a:t>
             </a:fld>
             <a:endParaRPr lang="zh-TW" altLang="en-US"/>
           </a:p>
@@ -814,7 +814,7 @@
           <a:p>
             <a:fld id="{BFEB1A99-8C3F-4D98-8584-B5DB38B1A655}" type="datetimeFigureOut">
               <a:rPr lang="zh-TW" altLang="en-US" smtClean="0"/>
-              <a:t>2022/1/7</a:t>
+              <a:t>2022/5/21</a:t>
             </a:fld>
             <a:endParaRPr lang="zh-TW" altLang="en-US"/>
           </a:p>
@@ -1055,7 +1055,7 @@
           <a:p>
             <a:fld id="{BFEB1A99-8C3F-4D98-8584-B5DB38B1A655}" type="datetimeFigureOut">
               <a:rPr lang="zh-TW" altLang="en-US" smtClean="0"/>
-              <a:t>2022/1/7</a:t>
+              <a:t>2022/5/21</a:t>
             </a:fld>
             <a:endParaRPr lang="zh-TW" altLang="en-US"/>
           </a:p>
@@ -1338,7 +1338,7 @@
           <a:p>
             <a:fld id="{BFEB1A99-8C3F-4D98-8584-B5DB38B1A655}" type="datetimeFigureOut">
               <a:rPr lang="zh-TW" altLang="en-US" smtClean="0"/>
-              <a:t>2022/1/7</a:t>
+              <a:t>2022/5/21</a:t>
             </a:fld>
             <a:endParaRPr lang="zh-TW" altLang="en-US"/>
           </a:p>
@@ -1755,7 +1755,7 @@
           <a:p>
             <a:fld id="{BFEB1A99-8C3F-4D98-8584-B5DB38B1A655}" type="datetimeFigureOut">
               <a:rPr lang="zh-TW" altLang="en-US" smtClean="0"/>
-              <a:t>2022/1/7</a:t>
+              <a:t>2022/5/21</a:t>
             </a:fld>
             <a:endParaRPr lang="zh-TW" altLang="en-US"/>
           </a:p>
@@ -1868,7 +1868,7 @@
           <a:p>
             <a:fld id="{BFEB1A99-8C3F-4D98-8584-B5DB38B1A655}" type="datetimeFigureOut">
               <a:rPr lang="zh-TW" altLang="en-US" smtClean="0"/>
-              <a:t>2022/1/7</a:t>
+              <a:t>2022/5/21</a:t>
             </a:fld>
             <a:endParaRPr lang="zh-TW" altLang="en-US"/>
           </a:p>
@@ -1958,7 +1958,7 @@
           <a:p>
             <a:fld id="{BFEB1A99-8C3F-4D98-8584-B5DB38B1A655}" type="datetimeFigureOut">
               <a:rPr lang="zh-TW" altLang="en-US" smtClean="0"/>
-              <a:t>2022/1/7</a:t>
+              <a:t>2022/5/21</a:t>
             </a:fld>
             <a:endParaRPr lang="zh-TW" altLang="en-US"/>
           </a:p>
@@ -2230,7 +2230,7 @@
           <a:p>
             <a:fld id="{BFEB1A99-8C3F-4D98-8584-B5DB38B1A655}" type="datetimeFigureOut">
               <a:rPr lang="zh-TW" altLang="en-US" smtClean="0"/>
-              <a:t>2022/1/7</a:t>
+              <a:t>2022/5/21</a:t>
             </a:fld>
             <a:endParaRPr lang="zh-TW" altLang="en-US"/>
           </a:p>
@@ -2482,7 +2482,7 @@
           <a:p>
             <a:fld id="{BFEB1A99-8C3F-4D98-8584-B5DB38B1A655}" type="datetimeFigureOut">
               <a:rPr lang="zh-TW" altLang="en-US" smtClean="0"/>
-              <a:t>2022/1/7</a:t>
+              <a:t>2022/5/21</a:t>
             </a:fld>
             <a:endParaRPr lang="zh-TW" altLang="en-US"/>
           </a:p>
@@ -2695,7 +2695,7 @@
           <a:p>
             <a:fld id="{BFEB1A99-8C3F-4D98-8584-B5DB38B1A655}" type="datetimeFigureOut">
               <a:rPr lang="zh-TW" altLang="en-US" smtClean="0"/>
-              <a:t>2022/1/7</a:t>
+              <a:t>2022/5/21</a:t>
             </a:fld>
             <a:endParaRPr lang="zh-TW" altLang="en-US"/>
           </a:p>
@@ -3077,7 +3077,7 @@
         </p:nvSpPr>
         <p:spPr>
           <a:xfrm>
-            <a:off x="0" y="2143135"/>
+            <a:off x="0" y="2067694"/>
             <a:ext cx="9144000" cy="857250"/>
           </a:xfrm>
         </p:spPr>

</xml_diff>